<commit_message>
survey neural program repair
</commit_message>
<xml_diff>
--- a/latex/popl2024/architecture_overview.pptx
+++ b/latex/popl2024/architecture_overview.pptx
@@ -197,7 +197,7 @@
           <a:p>
             <a:fld id="{4BCF36D4-1A3D-FF49-BD9D-8E92502A3136}" type="datetimeFigureOut">
               <a:rPr lang="en-US" smtClean="0"/>
-              <a:t>7/3/23</a:t>
+              <a:t>7/10/23</a:t>
             </a:fld>
             <a:endParaRPr lang="en-US"/>
           </a:p>
@@ -513,7 +513,7 @@
           <a:bodyPr/>
           <a:lstStyle/>
           <a:p>
-            <a:endParaRPr lang="en-US" dirty="0"/>
+            <a:endParaRPr lang="en-US"/>
           </a:p>
         </p:txBody>
       </p:sp>
@@ -684,7 +684,7 @@
           <a:p>
             <a:fld id="{4B75BEB6-BBAC-A946-9A0D-CADA25585596}" type="datetimeFigureOut">
               <a:rPr lang="en-US" smtClean="0"/>
-              <a:t>7/3/23</a:t>
+              <a:t>7/10/23</a:t>
             </a:fld>
             <a:endParaRPr lang="en-US"/>
           </a:p>
@@ -854,7 +854,7 @@
           <a:p>
             <a:fld id="{4B75BEB6-BBAC-A946-9A0D-CADA25585596}" type="datetimeFigureOut">
               <a:rPr lang="en-US" smtClean="0"/>
-              <a:t>7/3/23</a:t>
+              <a:t>7/10/23</a:t>
             </a:fld>
             <a:endParaRPr lang="en-US"/>
           </a:p>
@@ -1034,7 +1034,7 @@
           <a:p>
             <a:fld id="{4B75BEB6-BBAC-A946-9A0D-CADA25585596}" type="datetimeFigureOut">
               <a:rPr lang="en-US" smtClean="0"/>
-              <a:t>7/3/23</a:t>
+              <a:t>7/10/23</a:t>
             </a:fld>
             <a:endParaRPr lang="en-US"/>
           </a:p>
@@ -1204,7 +1204,7 @@
           <a:p>
             <a:fld id="{4B75BEB6-BBAC-A946-9A0D-CADA25585596}" type="datetimeFigureOut">
               <a:rPr lang="en-US" smtClean="0"/>
-              <a:t>7/3/23</a:t>
+              <a:t>7/10/23</a:t>
             </a:fld>
             <a:endParaRPr lang="en-US"/>
           </a:p>
@@ -1450,7 +1450,7 @@
           <a:p>
             <a:fld id="{4B75BEB6-BBAC-A946-9A0D-CADA25585596}" type="datetimeFigureOut">
               <a:rPr lang="en-US" smtClean="0"/>
-              <a:t>7/3/23</a:t>
+              <a:t>7/10/23</a:t>
             </a:fld>
             <a:endParaRPr lang="en-US"/>
           </a:p>
@@ -1682,7 +1682,7 @@
           <a:p>
             <a:fld id="{4B75BEB6-BBAC-A946-9A0D-CADA25585596}" type="datetimeFigureOut">
               <a:rPr lang="en-US" smtClean="0"/>
-              <a:t>7/3/23</a:t>
+              <a:t>7/10/23</a:t>
             </a:fld>
             <a:endParaRPr lang="en-US"/>
           </a:p>
@@ -2049,7 +2049,7 @@
           <a:p>
             <a:fld id="{4B75BEB6-BBAC-A946-9A0D-CADA25585596}" type="datetimeFigureOut">
               <a:rPr lang="en-US" smtClean="0"/>
-              <a:t>7/3/23</a:t>
+              <a:t>7/10/23</a:t>
             </a:fld>
             <a:endParaRPr lang="en-US"/>
           </a:p>
@@ -2167,7 +2167,7 @@
           <a:p>
             <a:fld id="{4B75BEB6-BBAC-A946-9A0D-CADA25585596}" type="datetimeFigureOut">
               <a:rPr lang="en-US" smtClean="0"/>
-              <a:t>7/3/23</a:t>
+              <a:t>7/10/23</a:t>
             </a:fld>
             <a:endParaRPr lang="en-US"/>
           </a:p>
@@ -2262,7 +2262,7 @@
           <a:p>
             <a:fld id="{4B75BEB6-BBAC-A946-9A0D-CADA25585596}" type="datetimeFigureOut">
               <a:rPr lang="en-US" smtClean="0"/>
-              <a:t>7/3/23</a:t>
+              <a:t>7/10/23</a:t>
             </a:fld>
             <a:endParaRPr lang="en-US"/>
           </a:p>
@@ -2539,7 +2539,7 @@
           <a:p>
             <a:fld id="{4B75BEB6-BBAC-A946-9A0D-CADA25585596}" type="datetimeFigureOut">
               <a:rPr lang="en-US" smtClean="0"/>
-              <a:t>7/3/23</a:t>
+              <a:t>7/10/23</a:t>
             </a:fld>
             <a:endParaRPr lang="en-US"/>
           </a:p>
@@ -2710,7 +2710,6 @@
               <a:rPr lang="en-US"/>
               <a:t>Click icon to add picture</a:t>
             </a:r>
-            <a:endParaRPr lang="en-US" dirty="0"/>
           </a:p>
         </p:txBody>
       </p:sp>
@@ -2796,7 +2795,7 @@
           <a:p>
             <a:fld id="{4B75BEB6-BBAC-A946-9A0D-CADA25585596}" type="datetimeFigureOut">
               <a:rPr lang="en-US" smtClean="0"/>
-              <a:t>7/3/23</a:t>
+              <a:t>7/10/23</a:t>
             </a:fld>
             <a:endParaRPr lang="en-US"/>
           </a:p>
@@ -3009,7 +3008,7 @@
           <a:p>
             <a:fld id="{4B75BEB6-BBAC-A946-9A0D-CADA25585596}" type="datetimeFigureOut">
               <a:rPr lang="en-US" smtClean="0"/>
-              <a:t>7/3/23</a:t>
+              <a:t>7/10/23</a:t>
             </a:fld>
             <a:endParaRPr lang="en-US"/>
           </a:p>
@@ -3428,7 +3427,7 @@
         </p:nvSpPr>
         <p:spPr>
           <a:xfrm>
-            <a:off x="9747037" y="1241922"/>
+            <a:off x="9667525" y="1196202"/>
             <a:ext cx="3458313" cy="400110"/>
           </a:xfrm>
           <a:prstGeom prst="rect">
@@ -3481,7 +3480,7 @@
         </p:blipFill>
         <p:spPr>
           <a:xfrm>
-            <a:off x="4466433" y="3329223"/>
+            <a:off x="4386921" y="3283503"/>
             <a:ext cx="1961045" cy="1961045"/>
           </a:xfrm>
           <a:prstGeom prst="rect">
@@ -3505,7 +3504,7 @@
         </p:nvCxnSpPr>
         <p:spPr>
           <a:xfrm>
-            <a:off x="5446944" y="1011180"/>
+            <a:off x="5367432" y="965460"/>
             <a:ext cx="0" cy="476250"/>
           </a:xfrm>
           <a:prstGeom prst="straightConnector1">
@@ -3551,7 +3550,7 @@
         </p:nvGrpSpPr>
         <p:grpSpPr>
           <a:xfrm>
-            <a:off x="5003382" y="1764880"/>
+            <a:off x="4923870" y="1719160"/>
             <a:ext cx="914400" cy="983425"/>
             <a:chOff x="1437540" y="2373444"/>
             <a:chExt cx="1603506" cy="1720331"/>
@@ -4159,7 +4158,7 @@
         </p:blipFill>
         <p:spPr>
           <a:xfrm>
-            <a:off x="5179088" y="2958058"/>
+            <a:off x="5099576" y="2912338"/>
             <a:ext cx="584701" cy="584701"/>
           </a:xfrm>
           <a:prstGeom prst="rect">
@@ -4195,7 +4194,7 @@
         </p:blipFill>
         <p:spPr>
           <a:xfrm>
-            <a:off x="6287407" y="4399326"/>
+            <a:off x="6207895" y="4353606"/>
             <a:ext cx="599856" cy="599856"/>
           </a:xfrm>
           <a:prstGeom prst="rect">
@@ -4217,7 +4216,7 @@
         </p:nvSpPr>
         <p:spPr>
           <a:xfrm>
-            <a:off x="2848502" y="6170794"/>
+            <a:off x="2768990" y="6125074"/>
             <a:ext cx="5151574" cy="476250"/>
           </a:xfrm>
           <a:prstGeom prst="roundRect">
@@ -4314,19 +4313,7 @@
                 </a:solidFill>
                 <a:latin typeface="JetBrains Mono" panose="02000009000000000000" pitchFamily="49" charset="0"/>
               </a:rPr>
-              <a:t>(i</a:t>
-            </a:r>
-            <a:r>
-              <a:rPr lang="en-US" dirty="0">
-                <a:solidFill>
-                  <a:srgbClr val="080808"/>
-                </a:solidFill>
-                <a:highlight>
-                  <a:srgbClr val="FFFF00"/>
-                </a:highlight>
-                <a:latin typeface="JetBrains Mono" panose="02000009000000000000" pitchFamily="49" charset="0"/>
-              </a:rPr>
-              <a:t>)</a:t>
+              <a:t>(i)</a:t>
             </a:r>
             <a:r>
               <a:rPr lang="en-US" dirty="0">
@@ -4362,28 +4349,7 @@
                 </a:solidFill>
                 <a:latin typeface="JetBrains Mono" panose="02000009000000000000" pitchFamily="49" charset="0"/>
               </a:rPr>
-              <a:t>vals</a:t>
-            </a:r>
-            <a:r>
-              <a:rPr lang="en-US" dirty="0">
-                <a:solidFill>
-                  <a:srgbClr val="080808"/>
-                </a:solidFill>
-                <a:highlight>
-                  <a:srgbClr val="FFFF00"/>
-                </a:highlight>
-                <a:latin typeface="JetBrains Mono" panose="02000009000000000000" pitchFamily="49" charset="0"/>
-              </a:rPr>
-              <a:t>]</a:t>
-            </a:r>
-            <a:r>
-              <a:rPr lang="en-US" dirty="0">
-                <a:solidFill>
-                  <a:srgbClr val="080808"/>
-                </a:solidFill>
-                <a:latin typeface="JetBrains Mono" panose="02000009000000000000" pitchFamily="49" charset="0"/>
-              </a:rPr>
-              <a:t>)</a:t>
+              <a:t>vals])</a:t>
             </a:r>
           </a:p>
           <a:p>
@@ -4406,7 +4372,7 @@
         </p:nvSpPr>
         <p:spPr>
           <a:xfrm>
-            <a:off x="2833231" y="279148"/>
+            <a:off x="2753719" y="233428"/>
             <a:ext cx="5131414" cy="476250"/>
           </a:xfrm>
           <a:prstGeom prst="roundRect">
@@ -4494,7 +4460,7 @@
               <a:t>(</a:t>
             </a:r>
             <a:r>
-              <a:rPr lang="en-US" u="wavy" dirty="0" err="1">
+              <a:rPr lang="en-US" u="wavy" dirty="0">
                 <a:solidFill>
                   <a:srgbClr val="080808"/>
                 </a:solidFill>
@@ -4505,21 +4471,7 @@
                 </a:uFill>
                 <a:latin typeface="JetBrains Mono" panose="02000009000000000000" pitchFamily="49" charset="0"/>
               </a:rPr>
-              <a:t>i</a:t>
-            </a:r>
-            <a:r>
-              <a:rPr lang="en-US" u="wavy" dirty="0">
-                <a:solidFill>
-                  <a:srgbClr val="080808"/>
-                </a:solidFill>
-                <a:uFill>
-                  <a:solidFill>
-                    <a:srgbClr val="FF0000"/>
-                  </a:solidFill>
-                </a:uFill>
-                <a:latin typeface="JetBrains Mono" panose="02000009000000000000" pitchFamily="49" charset="0"/>
-              </a:rPr>
-              <a:t>]</a:t>
+              <a:t>i]</a:t>
             </a:r>
             <a:r>
               <a:rPr lang="en-US" dirty="0">
@@ -4549,22 +4501,13 @@
               <a:t>in </a:t>
             </a:r>
             <a:r>
-              <a:rPr lang="en-US" dirty="0" err="1">
+              <a:rPr lang="en-US" dirty="0">
                 <a:solidFill>
                   <a:srgbClr val="080808"/>
                 </a:solidFill>
                 <a:latin typeface="JetBrains Mono" panose="02000009000000000000" pitchFamily="49" charset="0"/>
               </a:rPr>
-              <a:t>vals</a:t>
-            </a:r>
-            <a:r>
-              <a:rPr lang="en-US" dirty="0">
-                <a:solidFill>
-                  <a:srgbClr val="080808"/>
-                </a:solidFill>
-                <a:latin typeface="JetBrains Mono" panose="02000009000000000000" pitchFamily="49" charset="0"/>
-              </a:rPr>
-              <a:t>))</a:t>
+              <a:t>vals))</a:t>
             </a:r>
           </a:p>
         </p:txBody>
@@ -4585,7 +4528,7 @@
         </p:nvCxnSpPr>
         <p:spPr>
           <a:xfrm>
-            <a:off x="7355271" y="316694"/>
+            <a:off x="7275759" y="270974"/>
             <a:ext cx="0" cy="369332"/>
           </a:xfrm>
           <a:prstGeom prst="line">
@@ -4647,7 +4590,7 @@
         </p:blipFill>
         <p:spPr>
           <a:xfrm>
-            <a:off x="7230717" y="107159"/>
+            <a:off x="7151205" y="61439"/>
             <a:ext cx="476250" cy="476250"/>
           </a:xfrm>
           <a:prstGeom prst="rect">
@@ -4684,7 +4627,7 @@
         </p:blipFill>
         <p:spPr>
           <a:xfrm>
-            <a:off x="2235518" y="360138"/>
+            <a:off x="2156006" y="314418"/>
             <a:ext cx="388905" cy="325888"/>
           </a:xfrm>
           <a:prstGeom prst="rect">
@@ -4720,7 +4663,7 @@
         </p:blipFill>
         <p:spPr>
           <a:xfrm>
-            <a:off x="2289925" y="6245975"/>
+            <a:off x="2210413" y="6200255"/>
             <a:ext cx="388905" cy="325888"/>
           </a:xfrm>
           <a:prstGeom prst="rect">
@@ -4742,7 +4685,7 @@
         </p:nvSpPr>
         <p:spPr>
           <a:xfrm>
-            <a:off x="8678147" y="276486"/>
+            <a:off x="8598635" y="230766"/>
             <a:ext cx="5583598" cy="1181922"/>
           </a:xfrm>
           <a:prstGeom prst="roundRect">
@@ -4811,7 +4754,7 @@
                 </a:solidFill>
                 <a:latin typeface="JetBrains Mono" panose="02000009000000000000" pitchFamily="49" charset="0"/>
               </a:rPr>
-              <a:t> ID | ID ( S ) | S , S</a:t>
+              <a:t> ID | ID ( S ) | S , S | - S</a:t>
             </a:r>
           </a:p>
           <a:p>
@@ -4891,7 +4834,7 @@
         </p:nvCxnSpPr>
         <p:spPr>
           <a:xfrm rot="5400000">
-            <a:off x="8581656" y="-666018"/>
+            <a:off x="8502144" y="-711738"/>
             <a:ext cx="586483" cy="5202583"/>
           </a:xfrm>
           <a:prstGeom prst="curvedConnector2">
@@ -4950,7 +4893,7 @@
         </p:blipFill>
         <p:spPr>
           <a:xfrm>
-            <a:off x="4106681" y="4415717"/>
+            <a:off x="4027169" y="4369997"/>
             <a:ext cx="634153" cy="634153"/>
           </a:xfrm>
           <a:prstGeom prst="rect">
@@ -4974,8 +4917,8 @@
         </p:nvCxnSpPr>
         <p:spPr>
           <a:xfrm rot="10800000" flipV="1">
-            <a:off x="7185457" y="4699265"/>
-            <a:ext cx="2979377" cy="1311"/>
+            <a:off x="7105947" y="4654851"/>
+            <a:ext cx="1865495" cy="1"/>
           </a:xfrm>
           <a:prstGeom prst="curvedConnector3">
             <a:avLst>
@@ -5007,435 +4950,6 @@
           </a:fontRef>
         </p:style>
       </p:cxnSp>
-      <p:grpSp>
-        <p:nvGrpSpPr>
-          <p:cNvPr id="1138" name="Group 1137">
-            <a:extLst>
-              <a:ext uri="{FF2B5EF4-FFF2-40B4-BE49-F238E27FC236}">
-                <a16:creationId xmlns:a16="http://schemas.microsoft.com/office/drawing/2014/main" id="{E720729B-E5A6-CDE4-BC37-E5908BC93A13}"/>
-              </a:ext>
-            </a:extLst>
-          </p:cNvPr>
-          <p:cNvGrpSpPr/>
-          <p:nvPr/>
-        </p:nvGrpSpPr>
-        <p:grpSpPr>
-          <a:xfrm>
-            <a:off x="11964528" y="3636700"/>
-            <a:ext cx="940242" cy="963326"/>
-            <a:chOff x="10182575" y="3521781"/>
-            <a:chExt cx="1167194" cy="1181922"/>
-          </a:xfrm>
-          <a:effectLst>
-            <a:outerShdw blurRad="50800" dist="38100" dir="2700000" algn="tl" rotWithShape="0">
-              <a:prstClr val="black">
-                <a:alpha val="40000"/>
-              </a:prstClr>
-            </a:outerShdw>
-          </a:effectLst>
-        </p:grpSpPr>
-        <p:sp>
-          <p:nvSpPr>
-            <p:cNvPr id="1130" name="Rounded Rectangle 1129">
-              <a:extLst>
-                <a:ext uri="{FF2B5EF4-FFF2-40B4-BE49-F238E27FC236}">
-                  <a16:creationId xmlns:a16="http://schemas.microsoft.com/office/drawing/2014/main" id="{8159046B-6934-E22E-A753-D5F9848A04F3}"/>
-                </a:ext>
-              </a:extLst>
-            </p:cNvPr>
-            <p:cNvSpPr/>
-            <p:nvPr/>
-          </p:nvSpPr>
-          <p:spPr>
-            <a:xfrm>
-              <a:off x="10182575" y="3521781"/>
-              <a:ext cx="1167194" cy="1181922"/>
-            </a:xfrm>
-            <a:prstGeom prst="roundRect">
-              <a:avLst/>
-            </a:prstGeom>
-            <a:solidFill>
-              <a:schemeClr val="bg2">
-                <a:lumMod val="90000"/>
-              </a:schemeClr>
-            </a:solidFill>
-            <a:ln>
-              <a:noFill/>
-            </a:ln>
-          </p:spPr>
-          <p:style>
-            <a:lnRef idx="2">
-              <a:schemeClr val="accent1">
-                <a:shade val="50000"/>
-              </a:schemeClr>
-            </a:lnRef>
-            <a:fillRef idx="1">
-              <a:schemeClr val="accent1"/>
-            </a:fillRef>
-            <a:effectRef idx="0">
-              <a:schemeClr val="accent1"/>
-            </a:effectRef>
-            <a:fontRef idx="minor">
-              <a:schemeClr val="lt1"/>
-            </a:fontRef>
-          </p:style>
-          <p:txBody>
-            <a:bodyPr rtlCol="0" anchor="ctr"/>
-            <a:lstStyle/>
-            <a:p>
-              <a:pPr algn="ctr"/>
-              <a:endParaRPr lang="en-US" dirty="0"/>
-            </a:p>
-          </p:txBody>
-        </p:sp>
-        <p:pic>
-          <p:nvPicPr>
-            <p:cNvPr id="1117" name="Picture 6" descr="Neural Network Icons - Free SVG &amp; PNG Neural Network Images - Noun Project">
-              <a:extLst>
-                <a:ext uri="{FF2B5EF4-FFF2-40B4-BE49-F238E27FC236}">
-                  <a16:creationId xmlns:a16="http://schemas.microsoft.com/office/drawing/2014/main" id="{A1AF71AA-4F7B-FE20-576D-984125A90BA8}"/>
-                </a:ext>
-              </a:extLst>
-            </p:cNvPr>
-            <p:cNvPicPr>
-              <a:picLocks noChangeAspect="1" noChangeArrowheads="1"/>
-            </p:cNvPicPr>
-            <p:nvPr/>
-          </p:nvPicPr>
-          <p:blipFill>
-            <a:blip r:embed="rId17">
-              <a:extLst>
-                <a:ext uri="{28A0092B-C50C-407E-A947-70E740481C1C}">
-                  <a14:useLocalDpi xmlns:a14="http://schemas.microsoft.com/office/drawing/2010/main" val="0"/>
-                </a:ext>
-              </a:extLst>
-            </a:blip>
-            <a:srcRect/>
-            <a:stretch>
-              <a:fillRect/>
-            </a:stretch>
-          </p:blipFill>
-          <p:spPr bwMode="auto">
-            <a:xfrm>
-              <a:off x="10347108" y="3673945"/>
-              <a:ext cx="926042" cy="926042"/>
-            </a:xfrm>
-            <a:prstGeom prst="rect">
-              <a:avLst/>
-            </a:prstGeom>
-            <a:noFill/>
-            <a:ln>
-              <a:noFill/>
-            </a:ln>
-            <a:extLst>
-              <a:ext uri="{909E8E84-426E-40DD-AFC4-6F175D3DCCD1}">
-                <a14:hiddenFill xmlns:a14="http://schemas.microsoft.com/office/drawing/2010/main">
-                  <a:solidFill>
-                    <a:srgbClr val="FFFFFF"/>
-                  </a:solidFill>
-                </a14:hiddenFill>
-              </a:ext>
-            </a:extLst>
-          </p:spPr>
-        </p:pic>
-      </p:grpSp>
-      <p:grpSp>
-        <p:nvGrpSpPr>
-          <p:cNvPr id="1140" name="Group 1139">
-            <a:extLst>
-              <a:ext uri="{FF2B5EF4-FFF2-40B4-BE49-F238E27FC236}">
-                <a16:creationId xmlns:a16="http://schemas.microsoft.com/office/drawing/2014/main" id="{96060ACC-3D35-0C13-3DA2-B1736565117F}"/>
-              </a:ext>
-            </a:extLst>
-          </p:cNvPr>
-          <p:cNvGrpSpPr/>
-          <p:nvPr/>
-        </p:nvGrpSpPr>
-        <p:grpSpPr>
-          <a:xfrm>
-            <a:off x="10668356" y="4911683"/>
-            <a:ext cx="940242" cy="963326"/>
-            <a:chOff x="8553074" y="4800508"/>
-            <a:chExt cx="1167194" cy="1181922"/>
-          </a:xfrm>
-          <a:effectLst>
-            <a:outerShdw blurRad="50800" dist="38100" dir="2700000" algn="tl" rotWithShape="0">
-              <a:prstClr val="black">
-                <a:alpha val="40000"/>
-              </a:prstClr>
-            </a:outerShdw>
-          </a:effectLst>
-        </p:grpSpPr>
-        <p:sp>
-          <p:nvSpPr>
-            <p:cNvPr id="1132" name="Rounded Rectangle 1131">
-              <a:extLst>
-                <a:ext uri="{FF2B5EF4-FFF2-40B4-BE49-F238E27FC236}">
-                  <a16:creationId xmlns:a16="http://schemas.microsoft.com/office/drawing/2014/main" id="{8FFA210F-02BD-8687-4438-AE18A7892C52}"/>
-                </a:ext>
-              </a:extLst>
-            </p:cNvPr>
-            <p:cNvSpPr/>
-            <p:nvPr/>
-          </p:nvSpPr>
-          <p:spPr>
-            <a:xfrm>
-              <a:off x="8553074" y="4800508"/>
-              <a:ext cx="1167194" cy="1181922"/>
-            </a:xfrm>
-            <a:prstGeom prst="roundRect">
-              <a:avLst/>
-            </a:prstGeom>
-            <a:solidFill>
-              <a:schemeClr val="bg2">
-                <a:lumMod val="90000"/>
-              </a:schemeClr>
-            </a:solidFill>
-            <a:ln>
-              <a:noFill/>
-            </a:ln>
-          </p:spPr>
-          <p:style>
-            <a:lnRef idx="2">
-              <a:schemeClr val="accent1">
-                <a:shade val="50000"/>
-              </a:schemeClr>
-            </a:lnRef>
-            <a:fillRef idx="1">
-              <a:schemeClr val="accent1"/>
-            </a:fillRef>
-            <a:effectRef idx="0">
-              <a:schemeClr val="accent1"/>
-            </a:effectRef>
-            <a:fontRef idx="minor">
-              <a:schemeClr val="lt1"/>
-            </a:fontRef>
-          </p:style>
-          <p:txBody>
-            <a:bodyPr rtlCol="0" anchor="ctr"/>
-            <a:lstStyle/>
-            <a:p>
-              <a:pPr algn="ctr"/>
-              <a:endParaRPr lang="en-US" dirty="0"/>
-            </a:p>
-          </p:txBody>
-        </p:sp>
-        <p:pic>
-          <p:nvPicPr>
-            <p:cNvPr id="1119" name="Graphic 1118" descr="Normal Distribution outline">
-              <a:extLst>
-                <a:ext uri="{FF2B5EF4-FFF2-40B4-BE49-F238E27FC236}">
-                  <a16:creationId xmlns:a16="http://schemas.microsoft.com/office/drawing/2014/main" id="{48A2F7F9-36D4-47B2-5EAD-A2225A17E79F}"/>
-                </a:ext>
-              </a:extLst>
-            </p:cNvPr>
-            <p:cNvPicPr>
-              <a:picLocks noChangeAspect="1"/>
-            </p:cNvPicPr>
-            <p:nvPr/>
-          </p:nvPicPr>
-          <p:blipFill>
-            <a:blip r:embed="rId18">
-              <a:extLst>
-                <a:ext uri="{96DAC541-7B7A-43D3-8B79-37D633B846F1}">
-                  <asvg:svgBlip xmlns:asvg="http://schemas.microsoft.com/office/drawing/2016/SVG/main" r:embed="rId19"/>
-                </a:ext>
-              </a:extLst>
-            </a:blip>
-            <a:stretch>
-              <a:fillRect/>
-            </a:stretch>
-          </p:blipFill>
-          <p:spPr>
-            <a:xfrm>
-              <a:off x="8593903" y="4858288"/>
-              <a:ext cx="1066362" cy="1066362"/>
-            </a:xfrm>
-            <a:prstGeom prst="rect">
-              <a:avLst/>
-            </a:prstGeom>
-          </p:spPr>
-        </p:pic>
-      </p:grpSp>
-      <p:grpSp>
-        <p:nvGrpSpPr>
-          <p:cNvPr id="1139" name="Group 1138">
-            <a:extLst>
-              <a:ext uri="{FF2B5EF4-FFF2-40B4-BE49-F238E27FC236}">
-                <a16:creationId xmlns:a16="http://schemas.microsoft.com/office/drawing/2014/main" id="{5C53CA50-2C6F-DAA3-AE0F-CA4A838F9D32}"/>
-              </a:ext>
-            </a:extLst>
-          </p:cNvPr>
-          <p:cNvGrpSpPr/>
-          <p:nvPr/>
-        </p:nvGrpSpPr>
-        <p:grpSpPr>
-          <a:xfrm>
-            <a:off x="10658196" y="3669952"/>
-            <a:ext cx="940242" cy="963326"/>
-            <a:chOff x="8543487" y="3511470"/>
-            <a:chExt cx="1167194" cy="1181922"/>
-          </a:xfrm>
-          <a:effectLst>
-            <a:outerShdw blurRad="50800" dist="38100" dir="2700000" algn="tl" rotWithShape="0">
-              <a:prstClr val="black">
-                <a:alpha val="40000"/>
-              </a:prstClr>
-            </a:outerShdw>
-          </a:effectLst>
-        </p:grpSpPr>
-        <p:sp>
-          <p:nvSpPr>
-            <p:cNvPr id="1133" name="Rounded Rectangle 1132">
-              <a:extLst>
-                <a:ext uri="{FF2B5EF4-FFF2-40B4-BE49-F238E27FC236}">
-                  <a16:creationId xmlns:a16="http://schemas.microsoft.com/office/drawing/2014/main" id="{DA68FC2D-8B63-25CA-DA5B-D240E968E416}"/>
-                </a:ext>
-              </a:extLst>
-            </p:cNvPr>
-            <p:cNvSpPr/>
-            <p:nvPr/>
-          </p:nvSpPr>
-          <p:spPr>
-            <a:xfrm>
-              <a:off x="8543487" y="3511470"/>
-              <a:ext cx="1167194" cy="1181922"/>
-            </a:xfrm>
-            <a:prstGeom prst="roundRect">
-              <a:avLst/>
-            </a:prstGeom>
-            <a:solidFill>
-              <a:schemeClr val="bg2">
-                <a:lumMod val="90000"/>
-              </a:schemeClr>
-            </a:solidFill>
-            <a:ln>
-              <a:noFill/>
-            </a:ln>
-          </p:spPr>
-          <p:style>
-            <a:lnRef idx="2">
-              <a:schemeClr val="accent1">
-                <a:shade val="50000"/>
-              </a:schemeClr>
-            </a:lnRef>
-            <a:fillRef idx="1">
-              <a:schemeClr val="accent1"/>
-            </a:fillRef>
-            <a:effectRef idx="0">
-              <a:schemeClr val="accent1"/>
-            </a:effectRef>
-            <a:fontRef idx="minor">
-              <a:schemeClr val="lt1"/>
-            </a:fontRef>
-          </p:style>
-          <p:txBody>
-            <a:bodyPr rtlCol="0" anchor="ctr"/>
-            <a:lstStyle/>
-            <a:p>
-              <a:pPr algn="ctr"/>
-              <a:endParaRPr lang="en-US" dirty="0"/>
-            </a:p>
-          </p:txBody>
-        </p:sp>
-        <p:pic>
-          <p:nvPicPr>
-            <p:cNvPr id="1121" name="Graphic 1120" descr="Database outline">
-              <a:extLst>
-                <a:ext uri="{FF2B5EF4-FFF2-40B4-BE49-F238E27FC236}">
-                  <a16:creationId xmlns:a16="http://schemas.microsoft.com/office/drawing/2014/main" id="{E666F6C8-1E9B-7F0F-0370-20CBE58A778E}"/>
-                </a:ext>
-              </a:extLst>
-            </p:cNvPr>
-            <p:cNvPicPr>
-              <a:picLocks noChangeAspect="1"/>
-            </p:cNvPicPr>
-            <p:nvPr/>
-          </p:nvPicPr>
-          <p:blipFill>
-            <a:blip r:embed="rId20">
-              <a:extLst>
-                <a:ext uri="{96DAC541-7B7A-43D3-8B79-37D633B846F1}">
-                  <asvg:svgBlip xmlns:asvg="http://schemas.microsoft.com/office/drawing/2016/SVG/main" r:embed="rId21"/>
-                </a:ext>
-              </a:extLst>
-            </a:blip>
-            <a:stretch>
-              <a:fillRect/>
-            </a:stretch>
-          </p:blipFill>
-          <p:spPr>
-            <a:xfrm>
-              <a:off x="8750920" y="3716680"/>
-              <a:ext cx="771502" cy="771502"/>
-            </a:xfrm>
-            <a:prstGeom prst="rect">
-              <a:avLst/>
-            </a:prstGeom>
-          </p:spPr>
-        </p:pic>
-      </p:grpSp>
-      <p:sp>
-        <p:nvSpPr>
-          <p:cNvPr id="1131" name="Rounded Rectangle 1130">
-            <a:extLst>
-              <a:ext uri="{FF2B5EF4-FFF2-40B4-BE49-F238E27FC236}">
-                <a16:creationId xmlns:a16="http://schemas.microsoft.com/office/drawing/2014/main" id="{1387EF3D-6F2B-0300-8D3C-682A1A4C9D1F}"/>
-              </a:ext>
-            </a:extLst>
-          </p:cNvPr>
-          <p:cNvSpPr/>
-          <p:nvPr/>
-        </p:nvSpPr>
-        <p:spPr>
-          <a:xfrm>
-            <a:off x="11972841" y="4918130"/>
-            <a:ext cx="940242" cy="963326"/>
-          </a:xfrm>
-          <a:prstGeom prst="roundRect">
-            <a:avLst/>
-          </a:prstGeom>
-          <a:solidFill>
-            <a:schemeClr val="bg2">
-              <a:lumMod val="90000"/>
-            </a:schemeClr>
-          </a:solidFill>
-          <a:ln>
-            <a:noFill/>
-          </a:ln>
-          <a:effectLst>
-            <a:outerShdw blurRad="50800" dist="38100" dir="2700000" algn="tl" rotWithShape="0">
-              <a:prstClr val="black">
-                <a:alpha val="40000"/>
-              </a:prstClr>
-            </a:outerShdw>
-          </a:effectLst>
-        </p:spPr>
-        <p:style>
-          <a:lnRef idx="2">
-            <a:schemeClr val="accent1">
-              <a:shade val="50000"/>
-            </a:schemeClr>
-          </a:lnRef>
-          <a:fillRef idx="1">
-            <a:schemeClr val="accent1"/>
-          </a:fillRef>
-          <a:effectRef idx="0">
-            <a:schemeClr val="accent1"/>
-          </a:effectRef>
-          <a:fontRef idx="minor">
-            <a:schemeClr val="lt1"/>
-          </a:fontRef>
-        </p:style>
-        <p:txBody>
-          <a:bodyPr rtlCol="0" anchor="ctr"/>
-          <a:lstStyle/>
-          <a:p>
-            <a:pPr algn="ctr"/>
-            <a:endParaRPr lang="en-US" dirty="0"/>
-          </a:p>
-        </p:txBody>
-      </p:sp>
       <p:sp>
         <p:nvSpPr>
           <p:cNvPr id="31" name="Left Brace 30">
@@ -5450,7 +4964,7 @@
         </p:nvSpPr>
         <p:spPr>
           <a:xfrm>
-            <a:off x="10156936" y="3536476"/>
+            <a:off x="8959415" y="3487861"/>
             <a:ext cx="269326" cy="2456492"/>
           </a:xfrm>
           <a:prstGeom prst="leftBrace">
@@ -5503,7 +5017,7 @@
         </p:nvSpPr>
         <p:spPr>
           <a:xfrm>
-            <a:off x="13717478" y="1011180"/>
+            <a:off x="13637966" y="965460"/>
             <a:ext cx="533116" cy="400110"/>
           </a:xfrm>
           <a:prstGeom prst="rect">
@@ -5518,13 +5032,13 @@
           <a:lstStyle/>
           <a:p>
             <a:r>
-              <a:rPr lang="en-US" sz="2000" dirty="0">
+              <a:rPr lang="en-US" sz="2000">
                 <a:latin typeface="Calibri" panose="020F0502020204030204" pitchFamily="34" charset="0"/>
                 <a:cs typeface="Calibri" panose="020F0502020204030204" pitchFamily="34" charset="0"/>
               </a:rPr>
               <a:t>①</a:t>
             </a:r>
-            <a:endParaRPr lang="en-US" sz="2400" dirty="0">
+            <a:endParaRPr lang="en-US" sz="2400">
               <a:latin typeface="Calibri" panose="020F0502020204030204" pitchFamily="34" charset="0"/>
               <a:cs typeface="Calibri" panose="020F0502020204030204" pitchFamily="34" charset="0"/>
             </a:endParaRPr>
@@ -5545,7 +5059,7 @@
         </p:nvSpPr>
         <p:spPr>
           <a:xfrm>
-            <a:off x="7455085" y="318623"/>
+            <a:off x="7375573" y="272903"/>
             <a:ext cx="533116" cy="400110"/>
           </a:xfrm>
           <a:prstGeom prst="rect">
@@ -5560,13 +5074,13 @@
           <a:lstStyle/>
           <a:p>
             <a:r>
-              <a:rPr lang="en-US" sz="2000" dirty="0">
+              <a:rPr lang="en-US" sz="2000">
                 <a:latin typeface="Cambria" panose="02040503050406030204" pitchFamily="18" charset="0"/>
                 <a:cs typeface="Calibri" panose="020F0502020204030204" pitchFamily="34" charset="0"/>
               </a:rPr>
               <a:t>①</a:t>
             </a:r>
-            <a:endParaRPr lang="en-US" sz="2400" dirty="0">
+            <a:endParaRPr lang="en-US" sz="2400">
               <a:latin typeface="Cambria" panose="02040503050406030204" pitchFamily="18" charset="0"/>
               <a:cs typeface="Calibri" panose="020F0502020204030204" pitchFamily="34" charset="0"/>
             </a:endParaRPr>
@@ -5588,10 +5102,10 @@
           <p:nvPr/>
         </p:nvPicPr>
         <p:blipFill>
-          <a:blip r:embed="rId22">
+          <a:blip r:embed="rId17">
             <a:extLst>
               <a:ext uri="{96DAC541-7B7A-43D3-8B79-37D633B846F1}">
-                <asvg:svgBlip xmlns:asvg="http://schemas.microsoft.com/office/drawing/2016/SVG/main" r:embed="rId23"/>
+                <asvg:svgBlip xmlns:asvg="http://schemas.microsoft.com/office/drawing/2016/SVG/main" r:embed="rId18"/>
               </a:ext>
             </a:extLst>
           </a:blip>
@@ -5601,7 +5115,7 @@
         </p:blipFill>
         <p:spPr>
           <a:xfrm rot="5400000">
-            <a:off x="4876224" y="4957897"/>
+            <a:off x="4796712" y="4912177"/>
             <a:ext cx="887565" cy="887565"/>
           </a:xfrm>
           <a:prstGeom prst="rect">
@@ -5623,7 +5137,7 @@
         </p:nvSpPr>
         <p:spPr>
           <a:xfrm>
-            <a:off x="4883850" y="1713448"/>
+            <a:off x="4804338" y="1667728"/>
             <a:ext cx="1135349" cy="995578"/>
           </a:xfrm>
           <a:prstGeom prst="bracketPair">
@@ -5675,7 +5189,7 @@
         </p:nvSpPr>
         <p:spPr>
           <a:xfrm>
-            <a:off x="5818127" y="2928111"/>
+            <a:off x="5738615" y="2882391"/>
             <a:ext cx="469291" cy="400110"/>
           </a:xfrm>
           <a:prstGeom prst="rect">
@@ -5690,7 +5204,7 @@
           <a:lstStyle/>
           <a:p>
             <a:r>
-              <a:rPr lang="en-US" sz="2000" dirty="0">
+              <a:rPr lang="en-US" sz="2000">
                 <a:latin typeface="Calibri" panose="020F0502020204030204" pitchFamily="34" charset="0"/>
                 <a:cs typeface="Calibri" panose="020F0502020204030204" pitchFamily="34" charset="0"/>
               </a:rPr>
@@ -5715,7 +5229,7 @@
         </p:nvCxnSpPr>
         <p:spPr>
           <a:xfrm>
-            <a:off x="7370742" y="6210896"/>
+            <a:off x="7291230" y="6165176"/>
             <a:ext cx="0" cy="369332"/>
           </a:xfrm>
           <a:prstGeom prst="line">
@@ -5777,7 +5291,7 @@
         </p:blipFill>
         <p:spPr>
           <a:xfrm>
-            <a:off x="7246188" y="5985246"/>
+            <a:off x="7166676" y="5939526"/>
             <a:ext cx="476250" cy="476250"/>
           </a:xfrm>
           <a:prstGeom prst="rect">
@@ -5800,7 +5314,7 @@
         </p:nvSpPr>
         <p:spPr>
           <a:xfrm>
-            <a:off x="12930875" y="5965964"/>
+            <a:off x="13631033" y="5978179"/>
             <a:ext cx="466889" cy="400110"/>
           </a:xfrm>
           <a:prstGeom prst="rect">
@@ -5821,53 +5335,6 @@
           </a:p>
         </p:txBody>
       </p:sp>
-      <p:pic>
-        <p:nvPicPr>
-          <p:cNvPr id="1089" name="Picture 6" descr="Git - Logo Downloads">
-            <a:extLst>
-              <a:ext uri="{FF2B5EF4-FFF2-40B4-BE49-F238E27FC236}">
-                <a16:creationId xmlns:a16="http://schemas.microsoft.com/office/drawing/2014/main" id="{2A422103-EEC0-12B6-1911-A4890D178CFC}"/>
-              </a:ext>
-            </a:extLst>
-          </p:cNvPr>
-          <p:cNvPicPr>
-            <a:picLocks noChangeAspect="1" noChangeArrowheads="1"/>
-          </p:cNvPicPr>
-          <p:nvPr/>
-        </p:nvPicPr>
-        <p:blipFill>
-          <a:blip r:embed="rId24">
-            <a:extLst>
-              <a:ext uri="{28A0092B-C50C-407E-A947-70E740481C1C}">
-                <a14:useLocalDpi xmlns:a14="http://schemas.microsoft.com/office/drawing/2010/main" val="0"/>
-              </a:ext>
-            </a:extLst>
-          </a:blip>
-          <a:srcRect/>
-          <a:stretch>
-            <a:fillRect/>
-          </a:stretch>
-        </p:blipFill>
-        <p:spPr bwMode="auto">
-          <a:xfrm>
-            <a:off x="12124198" y="5092180"/>
-            <a:ext cx="637528" cy="637528"/>
-          </a:xfrm>
-          <a:prstGeom prst="rect">
-            <a:avLst/>
-          </a:prstGeom>
-          <a:noFill/>
-          <a:extLst>
-            <a:ext uri="{909E8E84-426E-40DD-AFC4-6F175D3DCCD1}">
-              <a14:hiddenFill xmlns:a14="http://schemas.microsoft.com/office/drawing/2010/main">
-                <a:solidFill>
-                  <a:srgbClr val="FFFFFF"/>
-                </a:solidFill>
-              </a14:hiddenFill>
-            </a:ext>
-          </a:extLst>
-        </p:spPr>
-      </p:pic>
       <p:sp>
         <p:nvSpPr>
           <p:cNvPr id="1094" name="TextBox 1093">
@@ -5882,7 +5349,7 @@
         </p:nvSpPr>
         <p:spPr>
           <a:xfrm>
-            <a:off x="5224091" y="4111464"/>
+            <a:off x="5144579" y="4065744"/>
             <a:ext cx="476250" cy="400110"/>
           </a:xfrm>
           <a:prstGeom prst="rect">
@@ -5897,7 +5364,7 @@
           <a:lstStyle/>
           <a:p>
             <a:r>
-              <a:rPr lang="en-US" sz="2000" dirty="0">
+              <a:rPr lang="en-US" sz="2000">
                 <a:latin typeface="Calibri" panose="020F0502020204030204" pitchFamily="34" charset="0"/>
                 <a:cs typeface="Calibri" panose="020F0502020204030204" pitchFamily="34" charset="0"/>
               </a:rPr>
@@ -5922,7 +5389,7 @@
         </p:nvCxnSpPr>
         <p:spPr>
           <a:xfrm>
-            <a:off x="2792894" y="4699254"/>
+            <a:off x="2713382" y="4653534"/>
             <a:ext cx="998048" cy="0"/>
           </a:xfrm>
           <a:prstGeom prst="straightConnector1">
@@ -5968,7 +5435,7 @@
         </p:nvGrpSpPr>
         <p:grpSpPr>
           <a:xfrm rot="5400000">
-            <a:off x="-846436" y="2842692"/>
+            <a:off x="-925948" y="2796972"/>
             <a:ext cx="3880368" cy="927739"/>
             <a:chOff x="918754" y="4555461"/>
             <a:chExt cx="3880368" cy="927739"/>
@@ -5989,7 +5456,7 @@
             <p:nvPr/>
           </p:nvPicPr>
           <p:blipFill rotWithShape="1">
-            <a:blip r:embed="rId25">
+            <a:blip r:embed="rId19">
               <a:extLst>
                 <a:ext uri="{28A0092B-C50C-407E-A947-70E740481C1C}">
                   <a14:useLocalDpi xmlns:a14="http://schemas.microsoft.com/office/drawing/2010/main" val="0"/>
@@ -6164,7 +5631,7 @@
             <a:lstStyle/>
             <a:p>
               <a:pPr algn="ctr"/>
-              <a:endParaRPr lang="en-US" dirty="0"/>
+              <a:endParaRPr lang="en-US"/>
             </a:p>
           </p:txBody>
         </p:sp>
@@ -6447,8 +5914,8 @@
         </p:nvSpPr>
         <p:spPr>
           <a:xfrm>
-            <a:off x="226826" y="1346173"/>
-            <a:ext cx="502408" cy="400110"/>
+            <a:off x="194928" y="1300453"/>
+            <a:ext cx="454794" cy="400110"/>
           </a:xfrm>
           <a:prstGeom prst="rect">
             <a:avLst/>
@@ -6482,7 +5949,7 @@
         </p:nvSpPr>
         <p:spPr>
           <a:xfrm>
-            <a:off x="7477961" y="6206505"/>
+            <a:off x="7398449" y="6160785"/>
             <a:ext cx="489749" cy="400110"/>
           </a:xfrm>
           <a:prstGeom prst="rect">
@@ -6497,12 +5964,12 @@
           <a:lstStyle/>
           <a:p>
             <a:r>
-              <a:rPr lang="en-US" sz="2000" dirty="0">
+              <a:rPr lang="en-US" sz="2000">
                 <a:cs typeface="Calibri" panose="020F0502020204030204" pitchFamily="34" charset="0"/>
               </a:rPr>
               <a:t>⑥</a:t>
             </a:r>
-            <a:endParaRPr lang="en-US" dirty="0">
+            <a:endParaRPr lang="en-US">
               <a:cs typeface="Calibri" panose="020F0502020204030204" pitchFamily="34" charset="0"/>
             </a:endParaRPr>
           </a:p>
@@ -6522,7 +5989,7 @@
         </p:nvGrpSpPr>
         <p:grpSpPr>
           <a:xfrm rot="16200000">
-            <a:off x="294689" y="2842696"/>
+            <a:off x="215177" y="2796976"/>
             <a:ext cx="3880368" cy="927739"/>
             <a:chOff x="918754" y="4555461"/>
             <a:chExt cx="3880368" cy="927739"/>
@@ -6543,7 +6010,7 @@
             <p:nvPr/>
           </p:nvPicPr>
           <p:blipFill rotWithShape="1">
-            <a:blip r:embed="rId25">
+            <a:blip r:embed="rId19">
               <a:extLst>
                 <a:ext uri="{28A0092B-C50C-407E-A947-70E740481C1C}">
                   <a14:useLocalDpi xmlns:a14="http://schemas.microsoft.com/office/drawing/2010/main" val="0"/>
@@ -6718,7 +6185,7 @@
             <a:lstStyle/>
             <a:p>
               <a:pPr algn="ctr"/>
-              <a:endParaRPr lang="en-US" dirty="0"/>
+              <a:endParaRPr lang="en-US"/>
             </a:p>
           </p:txBody>
         </p:sp>
@@ -6987,6 +6454,1120 @@
           </p:txBody>
         </p:sp>
       </p:grpSp>
+      <p:sp>
+        <p:nvSpPr>
+          <p:cNvPr id="6" name="TextBox 5">
+            <a:extLst>
+              <a:ext uri="{FF2B5EF4-FFF2-40B4-BE49-F238E27FC236}">
+                <a16:creationId xmlns:a16="http://schemas.microsoft.com/office/drawing/2014/main" id="{F1B69AE0-D5E2-D06C-321C-75075F56894A}"/>
+              </a:ext>
+            </a:extLst>
+          </p:cNvPr>
+          <p:cNvSpPr txBox="1"/>
+          <p:nvPr/>
+        </p:nvSpPr>
+        <p:spPr>
+          <a:xfrm>
+            <a:off x="9269638" y="3703781"/>
+            <a:ext cx="4979246" cy="2031325"/>
+          </a:xfrm>
+          <a:prstGeom prst="rect">
+            <a:avLst/>
+          </a:prstGeom>
+          <a:noFill/>
+        </p:spPr>
+        <p:txBody>
+          <a:bodyPr wrap="square">
+            <a:spAutoFit/>
+          </a:bodyPr>
+          <a:lstStyle/>
+          <a:p>
+            <a:pPr marL="342900" indent="-342900">
+              <a:buAutoNum type="arabicPeriod"/>
+            </a:pPr>
+            <a:r>
+              <a:rPr lang="en-US" dirty="0">
+                <a:solidFill>
+                  <a:srgbClr val="080808"/>
+                </a:solidFill>
+                <a:latin typeface="JetBrains Mono" panose="02000009000000000000" pitchFamily="49" charset="0"/>
+              </a:rPr>
+              <a:t>d = </a:t>
+            </a:r>
+            <a:r>
+              <a:rPr lang="en-US" dirty="0">
+                <a:solidFill>
+                  <a:srgbClr val="000080"/>
+                </a:solidFill>
+                <a:latin typeface="JetBrains Mono" panose="02000009000000000000" pitchFamily="49" charset="0"/>
+              </a:rPr>
+              <a:t>sum</a:t>
+            </a:r>
+            <a:r>
+              <a:rPr lang="en-US" dirty="0">
+                <a:solidFill>
+                  <a:srgbClr val="080808"/>
+                </a:solidFill>
+                <a:latin typeface="JetBrains Mono" panose="02000009000000000000" pitchFamily="49" charset="0"/>
+              </a:rPr>
+              <a:t>([</a:t>
+            </a:r>
+            <a:r>
+              <a:rPr lang="en-US" dirty="0">
+                <a:solidFill>
+                  <a:srgbClr val="000080"/>
+                </a:solidFill>
+                <a:latin typeface="JetBrains Mono" panose="02000009000000000000" pitchFamily="49" charset="0"/>
+              </a:rPr>
+              <a:t>foo</a:t>
+            </a:r>
+            <a:r>
+              <a:rPr lang="en-US" dirty="0">
+                <a:solidFill>
+                  <a:srgbClr val="080808"/>
+                </a:solidFill>
+                <a:latin typeface="JetBrains Mono" panose="02000009000000000000" pitchFamily="49" charset="0"/>
+              </a:rPr>
+              <a:t>(i)</a:t>
+            </a:r>
+            <a:r>
+              <a:rPr lang="en-US" dirty="0">
+                <a:solidFill>
+                  <a:srgbClr val="0033B3"/>
+                </a:solidFill>
+                <a:latin typeface="JetBrains Mono" panose="02000009000000000000" pitchFamily="49" charset="0"/>
+              </a:rPr>
+              <a:t> for </a:t>
+            </a:r>
+            <a:r>
+              <a:rPr lang="en-US" dirty="0">
+                <a:solidFill>
+                  <a:srgbClr val="080808"/>
+                </a:solidFill>
+                <a:latin typeface="JetBrains Mono" panose="02000009000000000000" pitchFamily="49" charset="0"/>
+              </a:rPr>
+              <a:t>i </a:t>
+            </a:r>
+            <a:r>
+              <a:rPr lang="en-US" dirty="0">
+                <a:solidFill>
+                  <a:srgbClr val="0033B3"/>
+                </a:solidFill>
+                <a:latin typeface="JetBrains Mono" panose="02000009000000000000" pitchFamily="49" charset="0"/>
+              </a:rPr>
+              <a:t>in </a:t>
+            </a:r>
+            <a:r>
+              <a:rPr lang="en-US" dirty="0">
+                <a:solidFill>
+                  <a:srgbClr val="080808"/>
+                </a:solidFill>
+                <a:latin typeface="JetBrains Mono" panose="02000009000000000000" pitchFamily="49" charset="0"/>
+              </a:rPr>
+              <a:t>vals])</a:t>
+            </a:r>
+          </a:p>
+          <a:p>
+            <a:pPr marL="342900" indent="-342900">
+              <a:buFontTx/>
+              <a:buAutoNum type="arabicPeriod"/>
+            </a:pPr>
+            <a:endParaRPr lang="en-US" dirty="0">
+              <a:solidFill>
+                <a:srgbClr val="080808"/>
+              </a:solidFill>
+              <a:latin typeface="JetBrains Mono" panose="02000009000000000000" pitchFamily="49" charset="0"/>
+            </a:endParaRPr>
+          </a:p>
+          <a:p>
+            <a:pPr marL="342900" indent="-342900">
+              <a:buFontTx/>
+              <a:buAutoNum type="arabicPeriod"/>
+            </a:pPr>
+            <a:r>
+              <a:rPr lang="en-US" dirty="0">
+                <a:solidFill>
+                  <a:srgbClr val="080808"/>
+                </a:solidFill>
+                <a:latin typeface="JetBrains Mono" panose="02000009000000000000" pitchFamily="49" charset="0"/>
+              </a:rPr>
+              <a:t>d = </a:t>
+            </a:r>
+            <a:r>
+              <a:rPr lang="en-US" dirty="0">
+                <a:solidFill>
+                  <a:srgbClr val="000080"/>
+                </a:solidFill>
+                <a:latin typeface="JetBrains Mono" panose="02000009000000000000" pitchFamily="49" charset="0"/>
+              </a:rPr>
+              <a:t>sum</a:t>
+            </a:r>
+            <a:r>
+              <a:rPr lang="en-US" dirty="0">
+                <a:solidFill>
+                  <a:srgbClr val="080808"/>
+                </a:solidFill>
+                <a:latin typeface="JetBrains Mono" panose="02000009000000000000" pitchFamily="49" charset="0"/>
+              </a:rPr>
+              <a:t>([</a:t>
+            </a:r>
+            <a:r>
+              <a:rPr lang="en-US" dirty="0">
+                <a:solidFill>
+                  <a:srgbClr val="000080"/>
+                </a:solidFill>
+                <a:latin typeface="JetBrains Mono" panose="02000009000000000000" pitchFamily="49" charset="0"/>
+              </a:rPr>
+              <a:t>   </a:t>
+            </a:r>
+            <a:r>
+              <a:rPr lang="en-US" dirty="0">
+                <a:solidFill>
+                  <a:srgbClr val="080808"/>
+                </a:solidFill>
+                <a:latin typeface="JetBrains Mono" panose="02000009000000000000" pitchFamily="49" charset="0"/>
+              </a:rPr>
+              <a:t>(i)</a:t>
+            </a:r>
+            <a:r>
+              <a:rPr lang="en-US" dirty="0">
+                <a:solidFill>
+                  <a:srgbClr val="0033B3"/>
+                </a:solidFill>
+                <a:latin typeface="JetBrains Mono" panose="02000009000000000000" pitchFamily="49" charset="0"/>
+              </a:rPr>
+              <a:t> for </a:t>
+            </a:r>
+            <a:r>
+              <a:rPr lang="en-US" dirty="0">
+                <a:solidFill>
+                  <a:srgbClr val="080808"/>
+                </a:solidFill>
+                <a:latin typeface="JetBrains Mono" panose="02000009000000000000" pitchFamily="49" charset="0"/>
+              </a:rPr>
+              <a:t>i </a:t>
+            </a:r>
+            <a:r>
+              <a:rPr lang="en-US" dirty="0">
+                <a:solidFill>
+                  <a:srgbClr val="0033B3"/>
+                </a:solidFill>
+                <a:latin typeface="JetBrains Mono" panose="02000009000000000000" pitchFamily="49" charset="0"/>
+              </a:rPr>
+              <a:t>in </a:t>
+            </a:r>
+            <a:r>
+              <a:rPr lang="en-US" dirty="0">
+                <a:solidFill>
+                  <a:srgbClr val="080808"/>
+                </a:solidFill>
+                <a:latin typeface="JetBrains Mono" panose="02000009000000000000" pitchFamily="49" charset="0"/>
+              </a:rPr>
+              <a:t>vals])</a:t>
+            </a:r>
+          </a:p>
+          <a:p>
+            <a:pPr marL="342900" indent="-342900">
+              <a:buFontTx/>
+              <a:buAutoNum type="arabicPeriod"/>
+            </a:pPr>
+            <a:endParaRPr lang="en-US" dirty="0">
+              <a:solidFill>
+                <a:srgbClr val="080808"/>
+              </a:solidFill>
+              <a:latin typeface="JetBrains Mono" panose="02000009000000000000" pitchFamily="49" charset="0"/>
+            </a:endParaRPr>
+          </a:p>
+          <a:p>
+            <a:pPr marL="342900" indent="-342900">
+              <a:buFontTx/>
+              <a:buAutoNum type="arabicPeriod"/>
+            </a:pPr>
+            <a:r>
+              <a:rPr lang="en-US" dirty="0">
+                <a:solidFill>
+                  <a:srgbClr val="080808"/>
+                </a:solidFill>
+                <a:latin typeface="JetBrains Mono" panose="02000009000000000000" pitchFamily="49" charset="0"/>
+              </a:rPr>
+              <a:t>d = </a:t>
+            </a:r>
+            <a:r>
+              <a:rPr lang="en-US" dirty="0">
+                <a:solidFill>
+                  <a:srgbClr val="000080"/>
+                </a:solidFill>
+                <a:latin typeface="JetBrains Mono" panose="02000009000000000000" pitchFamily="49" charset="0"/>
+              </a:rPr>
+              <a:t>sum</a:t>
+            </a:r>
+            <a:r>
+              <a:rPr lang="en-US" dirty="0">
+                <a:solidFill>
+                  <a:srgbClr val="080808"/>
+                </a:solidFill>
+                <a:latin typeface="JetBrains Mono" panose="02000009000000000000" pitchFamily="49" charset="0"/>
+              </a:rPr>
+              <a:t>([</a:t>
+            </a:r>
+            <a:r>
+              <a:rPr lang="en-US" dirty="0">
+                <a:solidFill>
+                  <a:srgbClr val="000080"/>
+                </a:solidFill>
+                <a:latin typeface="JetBrains Mono" panose="02000009000000000000" pitchFamily="49" charset="0"/>
+              </a:rPr>
+              <a:t>foo</a:t>
+            </a:r>
+            <a:r>
+              <a:rPr lang="en-US" dirty="0">
+                <a:solidFill>
+                  <a:srgbClr val="080808"/>
+                </a:solidFill>
+                <a:latin typeface="JetBrains Mono" panose="02000009000000000000" pitchFamily="49" charset="0"/>
+              </a:rPr>
+              <a:t>.i </a:t>
+            </a:r>
+            <a:r>
+              <a:rPr lang="en-US" dirty="0">
+                <a:solidFill>
+                  <a:srgbClr val="0033B3"/>
+                </a:solidFill>
+                <a:latin typeface="JetBrains Mono" panose="02000009000000000000" pitchFamily="49" charset="0"/>
+              </a:rPr>
+              <a:t> for </a:t>
+            </a:r>
+            <a:r>
+              <a:rPr lang="en-US" dirty="0">
+                <a:solidFill>
+                  <a:srgbClr val="080808"/>
+                </a:solidFill>
+                <a:latin typeface="JetBrains Mono" panose="02000009000000000000" pitchFamily="49" charset="0"/>
+              </a:rPr>
+              <a:t>i </a:t>
+            </a:r>
+            <a:r>
+              <a:rPr lang="en-US" dirty="0">
+                <a:solidFill>
+                  <a:srgbClr val="0033B3"/>
+                </a:solidFill>
+                <a:latin typeface="JetBrains Mono" panose="02000009000000000000" pitchFamily="49" charset="0"/>
+              </a:rPr>
+              <a:t>in </a:t>
+            </a:r>
+            <a:r>
+              <a:rPr lang="en-US" dirty="0">
+                <a:solidFill>
+                  <a:srgbClr val="080808"/>
+                </a:solidFill>
+                <a:latin typeface="JetBrains Mono" panose="02000009000000000000" pitchFamily="49" charset="0"/>
+              </a:rPr>
+              <a:t>vals])</a:t>
+            </a:r>
+          </a:p>
+          <a:p>
+            <a:pPr marL="342900" indent="-342900">
+              <a:buFontTx/>
+              <a:buAutoNum type="arabicPeriod"/>
+            </a:pPr>
+            <a:endParaRPr lang="en-US" dirty="0">
+              <a:solidFill>
+                <a:srgbClr val="080808"/>
+              </a:solidFill>
+              <a:latin typeface="JetBrains Mono" panose="02000009000000000000" pitchFamily="49" charset="0"/>
+            </a:endParaRPr>
+          </a:p>
+          <a:p>
+            <a:pPr marL="342900" indent="-342900">
+              <a:buFontTx/>
+              <a:buAutoNum type="arabicPeriod"/>
+            </a:pPr>
+            <a:r>
+              <a:rPr lang="en-US" dirty="0">
+                <a:solidFill>
+                  <a:srgbClr val="080808"/>
+                </a:solidFill>
+                <a:latin typeface="JetBrains Mono" panose="02000009000000000000" pitchFamily="49" charset="0"/>
+              </a:rPr>
+              <a:t>d = </a:t>
+            </a:r>
+            <a:r>
+              <a:rPr lang="en-US" dirty="0">
+                <a:solidFill>
+                  <a:srgbClr val="000080"/>
+                </a:solidFill>
+                <a:latin typeface="JetBrains Mono" panose="02000009000000000000" pitchFamily="49" charset="0"/>
+              </a:rPr>
+              <a:t>sum</a:t>
+            </a:r>
+            <a:r>
+              <a:rPr lang="en-US" dirty="0">
+                <a:solidFill>
+                  <a:srgbClr val="080808"/>
+                </a:solidFill>
+                <a:latin typeface="JetBrains Mono" panose="02000009000000000000" pitchFamily="49" charset="0"/>
+              </a:rPr>
+              <a:t>([</a:t>
+            </a:r>
+            <a:r>
+              <a:rPr lang="en-US" dirty="0">
+                <a:solidFill>
+                  <a:srgbClr val="000080"/>
+                </a:solidFill>
+                <a:latin typeface="JetBrains Mono" panose="02000009000000000000" pitchFamily="49" charset="0"/>
+              </a:rPr>
+              <a:t>foo</a:t>
+            </a:r>
+            <a:r>
+              <a:rPr lang="en-US" dirty="0">
+                <a:solidFill>
+                  <a:srgbClr val="080808"/>
+                </a:solidFill>
+                <a:latin typeface="JetBrains Mono" panose="02000009000000000000" pitchFamily="49" charset="0"/>
+              </a:rPr>
+              <a:t>(-i)</a:t>
+            </a:r>
+            <a:r>
+              <a:rPr lang="en-US" dirty="0">
+                <a:solidFill>
+                  <a:srgbClr val="0033B3"/>
+                </a:solidFill>
+                <a:latin typeface="JetBrains Mono" panose="02000009000000000000" pitchFamily="49" charset="0"/>
+              </a:rPr>
+              <a:t> for </a:t>
+            </a:r>
+            <a:r>
+              <a:rPr lang="en-US" dirty="0">
+                <a:solidFill>
+                  <a:srgbClr val="080808"/>
+                </a:solidFill>
+                <a:latin typeface="JetBrains Mono" panose="02000009000000000000" pitchFamily="49" charset="0"/>
+              </a:rPr>
+              <a:t>i </a:t>
+            </a:r>
+            <a:r>
+              <a:rPr lang="en-US" dirty="0">
+                <a:solidFill>
+                  <a:srgbClr val="0033B3"/>
+                </a:solidFill>
+                <a:latin typeface="JetBrains Mono" panose="02000009000000000000" pitchFamily="49" charset="0"/>
+              </a:rPr>
+              <a:t>in </a:t>
+            </a:r>
+            <a:r>
+              <a:rPr lang="en-US" dirty="0">
+                <a:solidFill>
+                  <a:srgbClr val="080808"/>
+                </a:solidFill>
+                <a:latin typeface="JetBrains Mono" panose="02000009000000000000" pitchFamily="49" charset="0"/>
+              </a:rPr>
+              <a:t>vals])</a:t>
+            </a:r>
+          </a:p>
+        </p:txBody>
+      </p:sp>
+      <p:sp>
+        <p:nvSpPr>
+          <p:cNvPr id="9" name="Rectangle 8">
+            <a:extLst>
+              <a:ext uri="{FF2B5EF4-FFF2-40B4-BE49-F238E27FC236}">
+                <a16:creationId xmlns:a16="http://schemas.microsoft.com/office/drawing/2014/main" id="{A9482E12-A033-FAE7-FD5C-54FB252BAA2C}"/>
+              </a:ext>
+            </a:extLst>
+          </p:cNvPr>
+          <p:cNvSpPr/>
+          <p:nvPr/>
+        </p:nvSpPr>
+        <p:spPr>
+          <a:xfrm>
+            <a:off x="10921863" y="4280738"/>
+            <a:ext cx="434975" cy="290877"/>
+          </a:xfrm>
+          <a:prstGeom prst="rect">
+            <a:avLst/>
+          </a:prstGeom>
+          <a:solidFill>
+            <a:srgbClr val="FF0000">
+              <a:alpha val="40000"/>
+            </a:srgbClr>
+          </a:solidFill>
+          <a:ln>
+            <a:noFill/>
+          </a:ln>
+        </p:spPr>
+        <p:style>
+          <a:lnRef idx="2">
+            <a:schemeClr val="accent1">
+              <a:shade val="15000"/>
+            </a:schemeClr>
+          </a:lnRef>
+          <a:fillRef idx="1">
+            <a:schemeClr val="accent1"/>
+          </a:fillRef>
+          <a:effectRef idx="0">
+            <a:schemeClr val="accent1"/>
+          </a:effectRef>
+          <a:fontRef idx="minor">
+            <a:schemeClr val="lt1"/>
+          </a:fontRef>
+        </p:style>
+        <p:txBody>
+          <a:bodyPr rtlCol="0" anchor="ctr"/>
+          <a:lstStyle/>
+          <a:p>
+            <a:pPr algn="ctr"/>
+            <a:endParaRPr lang="en-US"/>
+          </a:p>
+        </p:txBody>
+      </p:sp>
+      <p:sp>
+        <p:nvSpPr>
+          <p:cNvPr id="10" name="Rectangle 9">
+            <a:extLst>
+              <a:ext uri="{FF2B5EF4-FFF2-40B4-BE49-F238E27FC236}">
+                <a16:creationId xmlns:a16="http://schemas.microsoft.com/office/drawing/2014/main" id="{DC4066B9-8AC7-1412-F40E-25B97405007A}"/>
+              </a:ext>
+            </a:extLst>
+          </p:cNvPr>
+          <p:cNvSpPr/>
+          <p:nvPr/>
+        </p:nvSpPr>
+        <p:spPr>
+          <a:xfrm>
+            <a:off x="11619305" y="4828560"/>
+            <a:ext cx="143933" cy="296342"/>
+          </a:xfrm>
+          <a:prstGeom prst="rect">
+            <a:avLst/>
+          </a:prstGeom>
+          <a:solidFill>
+            <a:srgbClr val="FF0000">
+              <a:alpha val="40000"/>
+            </a:srgbClr>
+          </a:solidFill>
+          <a:ln>
+            <a:noFill/>
+          </a:ln>
+        </p:spPr>
+        <p:style>
+          <a:lnRef idx="2">
+            <a:schemeClr val="accent1">
+              <a:shade val="15000"/>
+            </a:schemeClr>
+          </a:lnRef>
+          <a:fillRef idx="1">
+            <a:schemeClr val="accent1"/>
+          </a:fillRef>
+          <a:effectRef idx="0">
+            <a:schemeClr val="accent1"/>
+          </a:effectRef>
+          <a:fontRef idx="minor">
+            <a:schemeClr val="lt1"/>
+          </a:fontRef>
+        </p:style>
+        <p:txBody>
+          <a:bodyPr rtlCol="0" anchor="ctr"/>
+          <a:lstStyle/>
+          <a:p>
+            <a:pPr algn="ctr"/>
+            <a:endParaRPr lang="en-US"/>
+          </a:p>
+        </p:txBody>
+      </p:sp>
+      <p:sp>
+        <p:nvSpPr>
+          <p:cNvPr id="11" name="Rectangle 10">
+            <a:extLst>
+              <a:ext uri="{FF2B5EF4-FFF2-40B4-BE49-F238E27FC236}">
+                <a16:creationId xmlns:a16="http://schemas.microsoft.com/office/drawing/2014/main" id="{359CD1EE-8C15-4FD5-9074-E4F273023A09}"/>
+              </a:ext>
+            </a:extLst>
+          </p:cNvPr>
+          <p:cNvSpPr/>
+          <p:nvPr/>
+        </p:nvSpPr>
+        <p:spPr>
+          <a:xfrm>
+            <a:off x="11467692" y="5365457"/>
+            <a:ext cx="143933" cy="296341"/>
+          </a:xfrm>
+          <a:prstGeom prst="rect">
+            <a:avLst/>
+          </a:prstGeom>
+          <a:solidFill>
+            <a:srgbClr val="00FF00">
+              <a:alpha val="29804"/>
+            </a:srgbClr>
+          </a:solidFill>
+          <a:ln>
+            <a:noFill/>
+          </a:ln>
+        </p:spPr>
+        <p:style>
+          <a:lnRef idx="2">
+            <a:schemeClr val="accent1">
+              <a:shade val="15000"/>
+            </a:schemeClr>
+          </a:lnRef>
+          <a:fillRef idx="1">
+            <a:schemeClr val="accent1"/>
+          </a:fillRef>
+          <a:effectRef idx="0">
+            <a:schemeClr val="accent1"/>
+          </a:effectRef>
+          <a:fontRef idx="minor">
+            <a:schemeClr val="lt1"/>
+          </a:fontRef>
+        </p:style>
+        <p:txBody>
+          <a:bodyPr rtlCol="0" anchor="ctr"/>
+          <a:lstStyle/>
+          <a:p>
+            <a:pPr algn="ctr"/>
+            <a:endParaRPr lang="en-US"/>
+          </a:p>
+        </p:txBody>
+      </p:sp>
+      <p:sp>
+        <p:nvSpPr>
+          <p:cNvPr id="12" name="Rectangle 11">
+            <a:extLst>
+              <a:ext uri="{FF2B5EF4-FFF2-40B4-BE49-F238E27FC236}">
+                <a16:creationId xmlns:a16="http://schemas.microsoft.com/office/drawing/2014/main" id="{01D4CCF5-507F-CBFA-4A5C-C9D1A5A697A6}"/>
+              </a:ext>
+            </a:extLst>
+          </p:cNvPr>
+          <p:cNvSpPr/>
+          <p:nvPr/>
+        </p:nvSpPr>
+        <p:spPr>
+          <a:xfrm>
+            <a:off x="11749630" y="5367975"/>
+            <a:ext cx="143933" cy="296342"/>
+          </a:xfrm>
+          <a:prstGeom prst="rect">
+            <a:avLst/>
+          </a:prstGeom>
+          <a:solidFill>
+            <a:srgbClr val="FF9300">
+              <a:alpha val="29804"/>
+            </a:srgbClr>
+          </a:solidFill>
+          <a:ln>
+            <a:noFill/>
+          </a:ln>
+        </p:spPr>
+        <p:style>
+          <a:lnRef idx="2">
+            <a:schemeClr val="accent1">
+              <a:shade val="15000"/>
+            </a:schemeClr>
+          </a:lnRef>
+          <a:fillRef idx="1">
+            <a:schemeClr val="accent1"/>
+          </a:fillRef>
+          <a:effectRef idx="0">
+            <a:schemeClr val="accent1"/>
+          </a:effectRef>
+          <a:fontRef idx="minor">
+            <a:schemeClr val="lt1"/>
+          </a:fontRef>
+        </p:style>
+        <p:txBody>
+          <a:bodyPr rtlCol="0" anchor="ctr"/>
+          <a:lstStyle/>
+          <a:p>
+            <a:pPr algn="ctr"/>
+            <a:endParaRPr lang="en-US"/>
+          </a:p>
+        </p:txBody>
+      </p:sp>
+      <p:sp>
+        <p:nvSpPr>
+          <p:cNvPr id="13" name="Rectangle 12">
+            <a:extLst>
+              <a:ext uri="{FF2B5EF4-FFF2-40B4-BE49-F238E27FC236}">
+                <a16:creationId xmlns:a16="http://schemas.microsoft.com/office/drawing/2014/main" id="{3C7AAE14-3502-4384-6B6D-B64A14EAED88}"/>
+              </a:ext>
+            </a:extLst>
+          </p:cNvPr>
+          <p:cNvSpPr/>
+          <p:nvPr/>
+        </p:nvSpPr>
+        <p:spPr>
+          <a:xfrm>
+            <a:off x="11619305" y="4280738"/>
+            <a:ext cx="143933" cy="296342"/>
+          </a:xfrm>
+          <a:prstGeom prst="rect">
+            <a:avLst/>
+          </a:prstGeom>
+          <a:solidFill>
+            <a:srgbClr val="FF9300">
+              <a:alpha val="29804"/>
+            </a:srgbClr>
+          </a:solidFill>
+          <a:ln>
+            <a:noFill/>
+          </a:ln>
+        </p:spPr>
+        <p:style>
+          <a:lnRef idx="2">
+            <a:schemeClr val="accent1">
+              <a:shade val="15000"/>
+            </a:schemeClr>
+          </a:lnRef>
+          <a:fillRef idx="1">
+            <a:schemeClr val="accent1"/>
+          </a:fillRef>
+          <a:effectRef idx="0">
+            <a:schemeClr val="accent1"/>
+          </a:effectRef>
+          <a:fontRef idx="minor">
+            <a:schemeClr val="lt1"/>
+          </a:fontRef>
+        </p:style>
+        <p:txBody>
+          <a:bodyPr rtlCol="0" anchor="ctr"/>
+          <a:lstStyle/>
+          <a:p>
+            <a:pPr algn="ctr"/>
+            <a:endParaRPr lang="en-US"/>
+          </a:p>
+        </p:txBody>
+      </p:sp>
+      <p:sp>
+        <p:nvSpPr>
+          <p:cNvPr id="14" name="Rectangle 13">
+            <a:extLst>
+              <a:ext uri="{FF2B5EF4-FFF2-40B4-BE49-F238E27FC236}">
+                <a16:creationId xmlns:a16="http://schemas.microsoft.com/office/drawing/2014/main" id="{BBF71FC8-9752-A60B-DE0C-59D9764B85F8}"/>
+              </a:ext>
+            </a:extLst>
+          </p:cNvPr>
+          <p:cNvSpPr/>
+          <p:nvPr/>
+        </p:nvSpPr>
+        <p:spPr>
+          <a:xfrm>
+            <a:off x="11619304" y="3732916"/>
+            <a:ext cx="143933" cy="296342"/>
+          </a:xfrm>
+          <a:prstGeom prst="rect">
+            <a:avLst/>
+          </a:prstGeom>
+          <a:solidFill>
+            <a:srgbClr val="FF9300">
+              <a:alpha val="29804"/>
+            </a:srgbClr>
+          </a:solidFill>
+          <a:ln>
+            <a:noFill/>
+          </a:ln>
+        </p:spPr>
+        <p:style>
+          <a:lnRef idx="2">
+            <a:schemeClr val="accent1">
+              <a:shade val="15000"/>
+            </a:schemeClr>
+          </a:lnRef>
+          <a:fillRef idx="1">
+            <a:schemeClr val="accent1"/>
+          </a:fillRef>
+          <a:effectRef idx="0">
+            <a:schemeClr val="accent1"/>
+          </a:effectRef>
+          <a:fontRef idx="minor">
+            <a:schemeClr val="lt1"/>
+          </a:fontRef>
+        </p:style>
+        <p:txBody>
+          <a:bodyPr rtlCol="0" anchor="ctr"/>
+          <a:lstStyle/>
+          <a:p>
+            <a:pPr algn="ctr"/>
+            <a:endParaRPr lang="en-US"/>
+          </a:p>
+        </p:txBody>
+      </p:sp>
+      <p:sp>
+        <p:nvSpPr>
+          <p:cNvPr id="15" name="Rectangle 14">
+            <a:extLst>
+              <a:ext uri="{FF2B5EF4-FFF2-40B4-BE49-F238E27FC236}">
+                <a16:creationId xmlns:a16="http://schemas.microsoft.com/office/drawing/2014/main" id="{5FDD4CCC-DA02-96BB-7278-0942C28C4552}"/>
+              </a:ext>
+            </a:extLst>
+          </p:cNvPr>
+          <p:cNvSpPr/>
+          <p:nvPr/>
+        </p:nvSpPr>
+        <p:spPr>
+          <a:xfrm>
+            <a:off x="13659468" y="3732916"/>
+            <a:ext cx="143933" cy="296342"/>
+          </a:xfrm>
+          <a:prstGeom prst="rect">
+            <a:avLst/>
+          </a:prstGeom>
+          <a:solidFill>
+            <a:srgbClr val="FF9300">
+              <a:alpha val="29804"/>
+            </a:srgbClr>
+          </a:solidFill>
+          <a:ln>
+            <a:noFill/>
+          </a:ln>
+        </p:spPr>
+        <p:style>
+          <a:lnRef idx="2">
+            <a:schemeClr val="accent1">
+              <a:shade val="15000"/>
+            </a:schemeClr>
+          </a:lnRef>
+          <a:fillRef idx="1">
+            <a:schemeClr val="accent1"/>
+          </a:fillRef>
+          <a:effectRef idx="0">
+            <a:schemeClr val="accent1"/>
+          </a:effectRef>
+          <a:fontRef idx="minor">
+            <a:schemeClr val="lt1"/>
+          </a:fontRef>
+        </p:style>
+        <p:txBody>
+          <a:bodyPr rtlCol="0" anchor="ctr"/>
+          <a:lstStyle/>
+          <a:p>
+            <a:pPr algn="ctr"/>
+            <a:endParaRPr lang="en-US"/>
+          </a:p>
+        </p:txBody>
+      </p:sp>
+      <p:sp>
+        <p:nvSpPr>
+          <p:cNvPr id="16" name="Rectangle 15">
+            <a:extLst>
+              <a:ext uri="{FF2B5EF4-FFF2-40B4-BE49-F238E27FC236}">
+                <a16:creationId xmlns:a16="http://schemas.microsoft.com/office/drawing/2014/main" id="{06B61E8E-B00A-D531-38AE-8EAA27A2B273}"/>
+              </a:ext>
+            </a:extLst>
+          </p:cNvPr>
+          <p:cNvSpPr/>
+          <p:nvPr/>
+        </p:nvSpPr>
+        <p:spPr>
+          <a:xfrm>
+            <a:off x="13659467" y="4275273"/>
+            <a:ext cx="143933" cy="296342"/>
+          </a:xfrm>
+          <a:prstGeom prst="rect">
+            <a:avLst/>
+          </a:prstGeom>
+          <a:solidFill>
+            <a:srgbClr val="FF9300">
+              <a:alpha val="29804"/>
+            </a:srgbClr>
+          </a:solidFill>
+          <a:ln>
+            <a:noFill/>
+          </a:ln>
+        </p:spPr>
+        <p:style>
+          <a:lnRef idx="2">
+            <a:schemeClr val="accent1">
+              <a:shade val="15000"/>
+            </a:schemeClr>
+          </a:lnRef>
+          <a:fillRef idx="1">
+            <a:schemeClr val="accent1"/>
+          </a:fillRef>
+          <a:effectRef idx="0">
+            <a:schemeClr val="accent1"/>
+          </a:effectRef>
+          <a:fontRef idx="minor">
+            <a:schemeClr val="lt1"/>
+          </a:fontRef>
+        </p:style>
+        <p:txBody>
+          <a:bodyPr rtlCol="0" anchor="ctr"/>
+          <a:lstStyle/>
+          <a:p>
+            <a:pPr algn="ctr"/>
+            <a:endParaRPr lang="en-US"/>
+          </a:p>
+        </p:txBody>
+      </p:sp>
+      <p:sp>
+        <p:nvSpPr>
+          <p:cNvPr id="18" name="Rectangle 17">
+            <a:extLst>
+              <a:ext uri="{FF2B5EF4-FFF2-40B4-BE49-F238E27FC236}">
+                <a16:creationId xmlns:a16="http://schemas.microsoft.com/office/drawing/2014/main" id="{3189B973-DD86-2CC0-2AA1-A56C14554466}"/>
+              </a:ext>
+            </a:extLst>
+          </p:cNvPr>
+          <p:cNvSpPr/>
+          <p:nvPr/>
+        </p:nvSpPr>
+        <p:spPr>
+          <a:xfrm>
+            <a:off x="13659466" y="4828560"/>
+            <a:ext cx="143933" cy="296342"/>
+          </a:xfrm>
+          <a:prstGeom prst="rect">
+            <a:avLst/>
+          </a:prstGeom>
+          <a:solidFill>
+            <a:srgbClr val="FF9300">
+              <a:alpha val="29804"/>
+            </a:srgbClr>
+          </a:solidFill>
+          <a:ln>
+            <a:noFill/>
+          </a:ln>
+        </p:spPr>
+        <p:style>
+          <a:lnRef idx="2">
+            <a:schemeClr val="accent1">
+              <a:shade val="15000"/>
+            </a:schemeClr>
+          </a:lnRef>
+          <a:fillRef idx="1">
+            <a:schemeClr val="accent1"/>
+          </a:fillRef>
+          <a:effectRef idx="0">
+            <a:schemeClr val="accent1"/>
+          </a:effectRef>
+          <a:fontRef idx="minor">
+            <a:schemeClr val="lt1"/>
+          </a:fontRef>
+        </p:style>
+        <p:txBody>
+          <a:bodyPr rtlCol="0" anchor="ctr"/>
+          <a:lstStyle/>
+          <a:p>
+            <a:pPr algn="ctr"/>
+            <a:endParaRPr lang="en-US"/>
+          </a:p>
+        </p:txBody>
+      </p:sp>
+      <p:sp>
+        <p:nvSpPr>
+          <p:cNvPr id="19" name="Rectangle 18">
+            <a:extLst>
+              <a:ext uri="{FF2B5EF4-FFF2-40B4-BE49-F238E27FC236}">
+                <a16:creationId xmlns:a16="http://schemas.microsoft.com/office/drawing/2014/main" id="{0C4D6446-FBD2-F6DD-55A1-A8C6F7641115}"/>
+              </a:ext>
+            </a:extLst>
+          </p:cNvPr>
+          <p:cNvSpPr/>
+          <p:nvPr/>
+        </p:nvSpPr>
+        <p:spPr>
+          <a:xfrm>
+            <a:off x="13792512" y="5367975"/>
+            <a:ext cx="143933" cy="296342"/>
+          </a:xfrm>
+          <a:prstGeom prst="rect">
+            <a:avLst/>
+          </a:prstGeom>
+          <a:solidFill>
+            <a:srgbClr val="FF9300">
+              <a:alpha val="29804"/>
+            </a:srgbClr>
+          </a:solidFill>
+          <a:ln>
+            <a:noFill/>
+          </a:ln>
+        </p:spPr>
+        <p:style>
+          <a:lnRef idx="2">
+            <a:schemeClr val="accent1">
+              <a:shade val="15000"/>
+            </a:schemeClr>
+          </a:lnRef>
+          <a:fillRef idx="1">
+            <a:schemeClr val="accent1"/>
+          </a:fillRef>
+          <a:effectRef idx="0">
+            <a:schemeClr val="accent1"/>
+          </a:effectRef>
+          <a:fontRef idx="minor">
+            <a:schemeClr val="lt1"/>
+          </a:fontRef>
+        </p:style>
+        <p:txBody>
+          <a:bodyPr rtlCol="0" anchor="ctr"/>
+          <a:lstStyle/>
+          <a:p>
+            <a:pPr algn="ctr"/>
+            <a:endParaRPr lang="en-US"/>
+          </a:p>
+        </p:txBody>
+      </p:sp>
+      <p:sp>
+        <p:nvSpPr>
+          <p:cNvPr id="21" name="Rectangle 20">
+            <a:extLst>
+              <a:ext uri="{FF2B5EF4-FFF2-40B4-BE49-F238E27FC236}">
+                <a16:creationId xmlns:a16="http://schemas.microsoft.com/office/drawing/2014/main" id="{01127CD2-207F-4436-A2ED-6E91F4ADE71E}"/>
+              </a:ext>
+            </a:extLst>
+          </p:cNvPr>
+          <p:cNvSpPr/>
+          <p:nvPr/>
+        </p:nvSpPr>
+        <p:spPr>
+          <a:xfrm>
+            <a:off x="6978823" y="6201671"/>
+            <a:ext cx="143933" cy="296342"/>
+          </a:xfrm>
+          <a:prstGeom prst="rect">
+            <a:avLst/>
+          </a:prstGeom>
+          <a:solidFill>
+            <a:srgbClr val="FF9300">
+              <a:alpha val="29804"/>
+            </a:srgbClr>
+          </a:solidFill>
+          <a:ln>
+            <a:noFill/>
+          </a:ln>
+        </p:spPr>
+        <p:style>
+          <a:lnRef idx="2">
+            <a:schemeClr val="accent1">
+              <a:shade val="15000"/>
+            </a:schemeClr>
+          </a:lnRef>
+          <a:fillRef idx="1">
+            <a:schemeClr val="accent1"/>
+          </a:fillRef>
+          <a:effectRef idx="0">
+            <a:schemeClr val="accent1"/>
+          </a:effectRef>
+          <a:fontRef idx="minor">
+            <a:schemeClr val="lt1"/>
+          </a:fontRef>
+        </p:style>
+        <p:txBody>
+          <a:bodyPr rtlCol="0" anchor="ctr"/>
+          <a:lstStyle/>
+          <a:p>
+            <a:pPr algn="ctr"/>
+            <a:endParaRPr lang="en-US"/>
+          </a:p>
+        </p:txBody>
+      </p:sp>
+      <p:sp>
+        <p:nvSpPr>
+          <p:cNvPr id="22" name="Rectangle 21">
+            <a:extLst>
+              <a:ext uri="{FF2B5EF4-FFF2-40B4-BE49-F238E27FC236}">
+                <a16:creationId xmlns:a16="http://schemas.microsoft.com/office/drawing/2014/main" id="{4E9C30E7-5F96-D602-E72F-014C8BB1252E}"/>
+              </a:ext>
+            </a:extLst>
+          </p:cNvPr>
+          <p:cNvSpPr/>
+          <p:nvPr/>
+        </p:nvSpPr>
+        <p:spPr>
+          <a:xfrm>
+            <a:off x="4923870" y="6197085"/>
+            <a:ext cx="143933" cy="296342"/>
+          </a:xfrm>
+          <a:prstGeom prst="rect">
+            <a:avLst/>
+          </a:prstGeom>
+          <a:solidFill>
+            <a:srgbClr val="FF9300">
+              <a:alpha val="29804"/>
+            </a:srgbClr>
+          </a:solidFill>
+          <a:ln>
+            <a:noFill/>
+          </a:ln>
+        </p:spPr>
+        <p:style>
+          <a:lnRef idx="2">
+            <a:schemeClr val="accent1">
+              <a:shade val="15000"/>
+            </a:schemeClr>
+          </a:lnRef>
+          <a:fillRef idx="1">
+            <a:schemeClr val="accent1"/>
+          </a:fillRef>
+          <a:effectRef idx="0">
+            <a:schemeClr val="accent1"/>
+          </a:effectRef>
+          <a:fontRef idx="minor">
+            <a:schemeClr val="lt1"/>
+          </a:fontRef>
+        </p:style>
+        <p:txBody>
+          <a:bodyPr rtlCol="0" anchor="ctr"/>
+          <a:lstStyle/>
+          <a:p>
+            <a:pPr algn="ctr"/>
+            <a:endParaRPr lang="en-US"/>
+          </a:p>
+        </p:txBody>
+      </p:sp>
+      <p:sp>
+        <p:nvSpPr>
+          <p:cNvPr id="23" name="Rectangle 22">
+            <a:extLst>
+              <a:ext uri="{FF2B5EF4-FFF2-40B4-BE49-F238E27FC236}">
+                <a16:creationId xmlns:a16="http://schemas.microsoft.com/office/drawing/2014/main" id="{2EA48CF7-BDBA-11AA-26C5-AE7D3AE6175D}"/>
+              </a:ext>
+            </a:extLst>
+          </p:cNvPr>
+          <p:cNvSpPr/>
+          <p:nvPr/>
+        </p:nvSpPr>
+        <p:spPr>
+          <a:xfrm>
+            <a:off x="11340790" y="4827024"/>
+            <a:ext cx="143933" cy="296342"/>
+          </a:xfrm>
+          <a:prstGeom prst="rect">
+            <a:avLst/>
+          </a:prstGeom>
+          <a:solidFill>
+            <a:srgbClr val="FF9300">
+              <a:alpha val="29804"/>
+            </a:srgbClr>
+          </a:solidFill>
+          <a:ln>
+            <a:noFill/>
+          </a:ln>
+        </p:spPr>
+        <p:style>
+          <a:lnRef idx="2">
+            <a:schemeClr val="accent1">
+              <a:shade val="15000"/>
+            </a:schemeClr>
+          </a:lnRef>
+          <a:fillRef idx="1">
+            <a:schemeClr val="accent1"/>
+          </a:fillRef>
+          <a:effectRef idx="0">
+            <a:schemeClr val="accent1"/>
+          </a:effectRef>
+          <a:fontRef idx="minor">
+            <a:schemeClr val="lt1"/>
+          </a:fontRef>
+        </p:style>
+        <p:txBody>
+          <a:bodyPr rtlCol="0" anchor="ctr"/>
+          <a:lstStyle/>
+          <a:p>
+            <a:pPr algn="ctr"/>
+            <a:endParaRPr lang="en-US"/>
+          </a:p>
+        </p:txBody>
+      </p:sp>
     </p:spTree>
     <p:extLst>
       <p:ext uri="{BB962C8B-B14F-4D97-AF65-F5344CB8AC3E}">

</xml_diff>